<commit_message>
some typo change '
</commit_message>
<xml_diff>
--- a/shi jiang ke/Lecture.pptx
+++ b/shi jiang ke/Lecture.pptx
@@ -9955,10 +9955,12 @@
               <a:t>Email: </a:t>
             </a:r>
             <a:r>
-              <a:rPr lang="en-US" dirty="0" err="1" smtClean="0"/>
+              <a:rPr lang="en-US" dirty="0" smtClean="0">
+                <a:hlinkClick r:id="rId3"/>
+              </a:rPr>
               <a:t>percytsy@gmail.com</a:t>
             </a:r>
-            <a:endParaRPr lang="en-US" dirty="0"/>
+            <a:endParaRPr lang="en-US" dirty="0" smtClean="0"/>
           </a:p>
         </p:txBody>
       </p:sp>
@@ -11482,6 +11484,10 @@
               <a:rPr lang="is-IS" dirty="0" smtClean="0"/>
               <a:t>…. </a:t>
             </a:r>
+            <a:r>
+              <a:rPr lang="is-IS" smtClean="0"/>
+              <a:t>(and/or logic)</a:t>
+            </a:r>
             <a:endParaRPr lang="en-US" dirty="0" smtClean="0"/>
           </a:p>
           <a:p>
@@ -11502,7 +11508,15 @@
             </a:r>
             <a:r>
               <a:rPr lang="is-IS" dirty="0" smtClean="0"/>
-              <a:t>reate, access, update, delete, get length, concatenation</a:t>
+              <a:t>reate, </a:t>
+            </a:r>
+            <a:r>
+              <a:rPr lang="is-IS" dirty="0" smtClean="0"/>
+              <a:t>access(reverse, range), </a:t>
+            </a:r>
+            <a:r>
+              <a:rPr lang="is-IS" dirty="0" smtClean="0"/>
+              <a:t>update, delete, get length, concatenation</a:t>
             </a:r>
           </a:p>
           <a:p>

</xml_diff>